<commit_message>
added md5, updated pz
</commit_message>
<xml_diff>
--- a/документация/Курсовая Презентация.pptx
+++ b/документация/Курсовая Презентация.pptx
@@ -6398,32 +6398,28 @@
       </p:sp>
       <p:pic>
         <p:nvPicPr>
-          <p:cNvPr id="5" name="Picture 4">
+          <p:cNvPr id="4" name="Picture 3">
             <a:extLst>
               <a:ext uri="{FF2B5EF4-FFF2-40B4-BE49-F238E27FC236}">
-                <a16:creationId xmlns:a16="http://schemas.microsoft.com/office/drawing/2014/main" id="{F50B10F3-E863-834E-8B36-9E4969B7D6B8}"/>
+                <a16:creationId xmlns:a16="http://schemas.microsoft.com/office/drawing/2014/main" id="{93E36E9B-F8EF-CD41-90D2-E214C62E5F79}"/>
               </a:ext>
             </a:extLst>
           </p:cNvPr>
-          <p:cNvPicPr/>
+          <p:cNvPicPr>
+            <a:picLocks noChangeAspect="1"/>
+          </p:cNvPicPr>
           <p:nvPr/>
         </p:nvPicPr>
         <p:blipFill>
-          <a:blip r:embed="rId2">
-            <a:extLst>
-              <a:ext uri="{28A0092B-C50C-407E-A947-70E740481C1C}">
-                <a14:useLocalDpi xmlns:a14="http://schemas.microsoft.com/office/drawing/2010/main" val="0"/>
-              </a:ext>
-            </a:extLst>
-          </a:blip>
+          <a:blip r:embed="rId2"/>
           <a:stretch>
             <a:fillRect/>
           </a:stretch>
         </p:blipFill>
         <p:spPr>
           <a:xfrm>
-            <a:off x="2439601" y="1853248"/>
-            <a:ext cx="7312797" cy="4322476"/>
+            <a:off x="165100" y="1878002"/>
+            <a:ext cx="11861800" cy="4527280"/>
           </a:xfrm>
           <a:prstGeom prst="rect">
             <a:avLst/>

</xml_diff>